<commit_message>
Finished first draft of binary counter docs.
</commit_message>
<xml_diff>
--- a/Doxygen/physics/13. Binary Counter Toy/figures.pptx
+++ b/Doxygen/physics/13. Binary Counter Toy/figures.pptx
@@ -6,8 +6,9 @@
   </p:sldMasterIdLst>
   <p:sldIdLst>
     <p:sldId id="257" r:id="rId2"/>
-    <p:sldId id="272" r:id="rId3"/>
-    <p:sldId id="259" r:id="rId4"/>
+    <p:sldId id="273" r:id="rId3"/>
+    <p:sldId id="272" r:id="rId4"/>
+    <p:sldId id="259" r:id="rId5"/>
   </p:sldIdLst>
   <p:sldSz cx="9144000" cy="6858000" type="screen4x3"/>
   <p:notesSz cx="6858000" cy="9144000"/>
@@ -106,6 +107,11 @@
       </a:defRPr>
     </a:lvl9pPr>
   </p:defaultTextStyle>
+  <p:extLst>
+    <p:ext uri="{EFAFB233-063F-42B5-8137-9DF3F51BA10A}">
+      <p15:sldGuideLst xmlns:p15="http://schemas.microsoft.com/office/powerpoint/2012/main"/>
+    </p:ext>
+  </p:extLst>
 </p:presentation>
 </file>
 
@@ -240,7 +246,7 @@
           <a:p>
             <a:fld id="{BD5CF3AC-EE51-497A-B82B-7061ECC02312}" type="datetimeFigureOut">
               <a:rPr lang="en-US" smtClean="0"/>
-              <a:t>2/28/2024</a:t>
+              <a:t>10/10/2024</a:t>
             </a:fld>
             <a:endParaRPr lang="en-US"/>
           </a:p>
@@ -410,7 +416,7 @@
           <a:p>
             <a:fld id="{BD5CF3AC-EE51-497A-B82B-7061ECC02312}" type="datetimeFigureOut">
               <a:rPr lang="en-US" smtClean="0"/>
-              <a:t>2/28/2024</a:t>
+              <a:t>10/10/2024</a:t>
             </a:fld>
             <a:endParaRPr lang="en-US"/>
           </a:p>
@@ -590,7 +596,7 @@
           <a:p>
             <a:fld id="{BD5CF3AC-EE51-497A-B82B-7061ECC02312}" type="datetimeFigureOut">
               <a:rPr lang="en-US" smtClean="0"/>
-              <a:t>2/28/2024</a:t>
+              <a:t>10/10/2024</a:t>
             </a:fld>
             <a:endParaRPr lang="en-US"/>
           </a:p>
@@ -760,7 +766,7 @@
           <a:p>
             <a:fld id="{BD5CF3AC-EE51-497A-B82B-7061ECC02312}" type="datetimeFigureOut">
               <a:rPr lang="en-US" smtClean="0"/>
-              <a:t>2/28/2024</a:t>
+              <a:t>10/10/2024</a:t>
             </a:fld>
             <a:endParaRPr lang="en-US"/>
           </a:p>
@@ -1004,7 +1010,7 @@
           <a:p>
             <a:fld id="{BD5CF3AC-EE51-497A-B82B-7061ECC02312}" type="datetimeFigureOut">
               <a:rPr lang="en-US" smtClean="0"/>
-              <a:t>2/28/2024</a:t>
+              <a:t>10/10/2024</a:t>
             </a:fld>
             <a:endParaRPr lang="en-US"/>
           </a:p>
@@ -1236,7 +1242,7 @@
           <a:p>
             <a:fld id="{BD5CF3AC-EE51-497A-B82B-7061ECC02312}" type="datetimeFigureOut">
               <a:rPr lang="en-US" smtClean="0"/>
-              <a:t>2/28/2024</a:t>
+              <a:t>10/10/2024</a:t>
             </a:fld>
             <a:endParaRPr lang="en-US"/>
           </a:p>
@@ -1603,7 +1609,7 @@
           <a:p>
             <a:fld id="{BD5CF3AC-EE51-497A-B82B-7061ECC02312}" type="datetimeFigureOut">
               <a:rPr lang="en-US" smtClean="0"/>
-              <a:t>2/28/2024</a:t>
+              <a:t>10/10/2024</a:t>
             </a:fld>
             <a:endParaRPr lang="en-US"/>
           </a:p>
@@ -1721,7 +1727,7 @@
           <a:p>
             <a:fld id="{BD5CF3AC-EE51-497A-B82B-7061ECC02312}" type="datetimeFigureOut">
               <a:rPr lang="en-US" smtClean="0"/>
-              <a:t>2/28/2024</a:t>
+              <a:t>10/10/2024</a:t>
             </a:fld>
             <a:endParaRPr lang="en-US"/>
           </a:p>
@@ -1816,7 +1822,7 @@
           <a:p>
             <a:fld id="{BD5CF3AC-EE51-497A-B82B-7061ECC02312}" type="datetimeFigureOut">
               <a:rPr lang="en-US" smtClean="0"/>
-              <a:t>2/28/2024</a:t>
+              <a:t>10/10/2024</a:t>
             </a:fld>
             <a:endParaRPr lang="en-US"/>
           </a:p>
@@ -2093,7 +2099,7 @@
           <a:p>
             <a:fld id="{BD5CF3AC-EE51-497A-B82B-7061ECC02312}" type="datetimeFigureOut">
               <a:rPr lang="en-US" smtClean="0"/>
-              <a:t>2/28/2024</a:t>
+              <a:t>10/10/2024</a:t>
             </a:fld>
             <a:endParaRPr lang="en-US"/>
           </a:p>
@@ -2350,7 +2356,7 @@
           <a:p>
             <a:fld id="{BD5CF3AC-EE51-497A-B82B-7061ECC02312}" type="datetimeFigureOut">
               <a:rPr lang="en-US" smtClean="0"/>
-              <a:t>2/28/2024</a:t>
+              <a:t>10/10/2024</a:t>
             </a:fld>
             <a:endParaRPr lang="en-US"/>
           </a:p>
@@ -2563,7 +2569,7 @@
           <a:p>
             <a:fld id="{BD5CF3AC-EE51-497A-B82B-7061ECC02312}" type="datetimeFigureOut">
               <a:rPr lang="en-US" smtClean="0"/>
-              <a:t>2/28/2024</a:t>
+              <a:t>10/10/2024</a:t>
             </a:fld>
             <a:endParaRPr lang="en-US"/>
           </a:p>
@@ -3623,6 +3629,765 @@
 </file>
 
 <file path=ppt/slides/slide2.xml><?xml version="1.0" encoding="utf-8"?>
+<p:sld xmlns:a="http://schemas.openxmlformats.org/drawingml/2006/main" xmlns:r="http://schemas.openxmlformats.org/officeDocument/2006/relationships" xmlns:p="http://schemas.openxmlformats.org/presentationml/2006/main">
+  <p:cSld>
+    <p:spTree>
+      <p:nvGrpSpPr>
+        <p:cNvPr id="1" name=""/>
+        <p:cNvGrpSpPr/>
+        <p:nvPr/>
+      </p:nvGrpSpPr>
+      <p:grpSpPr>
+        <a:xfrm>
+          <a:off x="0" y="0"/>
+          <a:ext cx="0" cy="0"/>
+          <a:chOff x="0" y="0"/>
+          <a:chExt cx="0" cy="0"/>
+        </a:xfrm>
+      </p:grpSpPr>
+      <p:pic>
+        <p:nvPicPr>
+          <p:cNvPr id="3" name="Picture 2" descr="A black and white sign&#10;&#10;Description automatically generated">
+            <a:extLst>
+              <a:ext uri="{FF2B5EF4-FFF2-40B4-BE49-F238E27FC236}">
+                <a16:creationId xmlns:a16="http://schemas.microsoft.com/office/drawing/2014/main" id="{7D85AEAF-382E-EE81-EE8E-8F2E07C4B9F3}"/>
+              </a:ext>
+            </a:extLst>
+          </p:cNvPr>
+          <p:cNvPicPr>
+            <a:picLocks noChangeAspect="1"/>
+          </p:cNvPicPr>
+          <p:nvPr/>
+        </p:nvPicPr>
+        <p:blipFill>
+          <a:blip r:embed="rId2">
+            <a:extLst>
+              <a:ext uri="{28A0092B-C50C-407E-A947-70E740481C1C}">
+                <a14:useLocalDpi xmlns:a14="http://schemas.microsoft.com/office/drawing/2010/main" val="0"/>
+              </a:ext>
+            </a:extLst>
+          </a:blip>
+          <a:stretch>
+            <a:fillRect/>
+          </a:stretch>
+        </p:blipFill>
+        <p:spPr>
+          <a:xfrm>
+            <a:off x="3366600" y="2952557"/>
+            <a:ext cx="2410799" cy="952885"/>
+          </a:xfrm>
+          <a:prstGeom prst="rect">
+            <a:avLst/>
+          </a:prstGeom>
+        </p:spPr>
+      </p:pic>
+      <p:sp>
+        <p:nvSpPr>
+          <p:cNvPr id="8" name="TextBox 7">
+            <a:extLst>
+              <a:ext uri="{FF2B5EF4-FFF2-40B4-BE49-F238E27FC236}">
+                <a16:creationId xmlns:a16="http://schemas.microsoft.com/office/drawing/2014/main" id="{F8293AED-AADB-223A-C96E-FD84E42FD49A}"/>
+              </a:ext>
+            </a:extLst>
+          </p:cNvPr>
+          <p:cNvSpPr txBox="1"/>
+          <p:nvPr/>
+        </p:nvSpPr>
+        <p:spPr>
+          <a:xfrm>
+            <a:off x="4193227" y="2213657"/>
+            <a:ext cx="1956020" cy="369332"/>
+          </a:xfrm>
+          <a:prstGeom prst="rect">
+            <a:avLst/>
+          </a:prstGeom>
+          <a:noFill/>
+        </p:spPr>
+        <p:txBody>
+          <a:bodyPr wrap="square" rtlCol="0">
+            <a:spAutoFit/>
+          </a:bodyPr>
+          <a:lstStyle/>
+          <a:p>
+            <a:pPr algn="ctr"/>
+            <a:r>
+              <a:rPr lang="en-US" dirty="0"/>
+              <a:t>Revolute joints</a:t>
+            </a:r>
+          </a:p>
+        </p:txBody>
+      </p:sp>
+      <p:cxnSp>
+        <p:nvCxnSpPr>
+          <p:cNvPr id="12" name="Straight Arrow Connector 11">
+            <a:extLst>
+              <a:ext uri="{FF2B5EF4-FFF2-40B4-BE49-F238E27FC236}">
+                <a16:creationId xmlns:a16="http://schemas.microsoft.com/office/drawing/2014/main" id="{979239BB-DAEC-38D8-BFEA-EE84D39552A3}"/>
+              </a:ext>
+            </a:extLst>
+          </p:cNvPr>
+          <p:cNvCxnSpPr>
+            <a:cxnSpLocks/>
+            <a:endCxn id="8" idx="2"/>
+          </p:cNvCxnSpPr>
+          <p:nvPr/>
+        </p:nvCxnSpPr>
+        <p:spPr>
+          <a:xfrm flipH="1" flipV="1">
+            <a:off x="5171237" y="2582989"/>
+            <a:ext cx="177051" cy="784099"/>
+          </a:xfrm>
+          <a:prstGeom prst="straightConnector1">
+            <a:avLst/>
+          </a:prstGeom>
+          <a:ln w="34925" cap="rnd">
+            <a:solidFill>
+              <a:schemeClr val="accent5"/>
+            </a:solidFill>
+            <a:headEnd type="arrow" w="med" len="lg"/>
+            <a:tailEnd type="none"/>
+          </a:ln>
+          <a:effectLst>
+            <a:outerShdw blurRad="50800" dist="38100" dir="2700000" algn="tl" rotWithShape="0">
+              <a:prstClr val="black">
+                <a:alpha val="40000"/>
+              </a:prstClr>
+            </a:outerShdw>
+          </a:effectLst>
+        </p:spPr>
+        <p:style>
+          <a:lnRef idx="1">
+            <a:schemeClr val="accent1"/>
+          </a:lnRef>
+          <a:fillRef idx="0">
+            <a:schemeClr val="accent1"/>
+          </a:fillRef>
+          <a:effectRef idx="0">
+            <a:schemeClr val="accent1"/>
+          </a:effectRef>
+          <a:fontRef idx="minor">
+            <a:schemeClr val="tx1"/>
+          </a:fontRef>
+        </p:style>
+      </p:cxnSp>
+      <p:cxnSp>
+        <p:nvCxnSpPr>
+          <p:cNvPr id="5" name="Straight Arrow Connector 4">
+            <a:extLst>
+              <a:ext uri="{FF2B5EF4-FFF2-40B4-BE49-F238E27FC236}">
+                <a16:creationId xmlns:a16="http://schemas.microsoft.com/office/drawing/2014/main" id="{BE577FB2-ABE4-08C8-96E1-6A63342B3487}"/>
+              </a:ext>
+            </a:extLst>
+          </p:cNvPr>
+          <p:cNvCxnSpPr>
+            <a:cxnSpLocks/>
+            <a:endCxn id="8" idx="2"/>
+          </p:cNvCxnSpPr>
+          <p:nvPr/>
+        </p:nvCxnSpPr>
+        <p:spPr>
+          <a:xfrm flipV="1">
+            <a:off x="4994186" y="2582989"/>
+            <a:ext cx="177051" cy="764510"/>
+          </a:xfrm>
+          <a:prstGeom prst="straightConnector1">
+            <a:avLst/>
+          </a:prstGeom>
+          <a:ln w="34925" cap="rnd">
+            <a:solidFill>
+              <a:schemeClr val="accent5"/>
+            </a:solidFill>
+            <a:headEnd type="arrow" w="med" len="lg"/>
+            <a:tailEnd type="none"/>
+          </a:ln>
+          <a:effectLst>
+            <a:outerShdw blurRad="50800" dist="38100" dir="2700000" algn="tl" rotWithShape="0">
+              <a:prstClr val="black">
+                <a:alpha val="40000"/>
+              </a:prstClr>
+            </a:outerShdw>
+          </a:effectLst>
+        </p:spPr>
+        <p:style>
+          <a:lnRef idx="1">
+            <a:schemeClr val="accent1"/>
+          </a:lnRef>
+          <a:fillRef idx="0">
+            <a:schemeClr val="accent1"/>
+          </a:fillRef>
+          <a:effectRef idx="0">
+            <a:schemeClr val="accent1"/>
+          </a:effectRef>
+          <a:fontRef idx="minor">
+            <a:schemeClr val="tx1"/>
+          </a:fontRef>
+        </p:style>
+      </p:cxnSp>
+      <p:cxnSp>
+        <p:nvCxnSpPr>
+          <p:cNvPr id="9" name="Straight Arrow Connector 8">
+            <a:extLst>
+              <a:ext uri="{FF2B5EF4-FFF2-40B4-BE49-F238E27FC236}">
+                <a16:creationId xmlns:a16="http://schemas.microsoft.com/office/drawing/2014/main" id="{FF24FF60-0679-B7AF-1F86-FE11FE913288}"/>
+              </a:ext>
+            </a:extLst>
+          </p:cNvPr>
+          <p:cNvCxnSpPr>
+            <a:cxnSpLocks/>
+            <a:endCxn id="8" idx="2"/>
+          </p:cNvCxnSpPr>
+          <p:nvPr/>
+        </p:nvCxnSpPr>
+        <p:spPr>
+          <a:xfrm flipV="1">
+            <a:off x="4696431" y="2582989"/>
+            <a:ext cx="474806" cy="802660"/>
+          </a:xfrm>
+          <a:prstGeom prst="straightConnector1">
+            <a:avLst/>
+          </a:prstGeom>
+          <a:ln w="34925" cap="rnd">
+            <a:solidFill>
+              <a:schemeClr val="accent5"/>
+            </a:solidFill>
+            <a:headEnd type="arrow" w="med" len="lg"/>
+            <a:tailEnd type="none"/>
+          </a:ln>
+          <a:effectLst>
+            <a:outerShdw blurRad="50800" dist="38100" dir="2700000" algn="tl" rotWithShape="0">
+              <a:prstClr val="black">
+                <a:alpha val="40000"/>
+              </a:prstClr>
+            </a:outerShdw>
+          </a:effectLst>
+        </p:spPr>
+        <p:style>
+          <a:lnRef idx="1">
+            <a:schemeClr val="accent1"/>
+          </a:lnRef>
+          <a:fillRef idx="0">
+            <a:schemeClr val="accent1"/>
+          </a:fillRef>
+          <a:effectRef idx="0">
+            <a:schemeClr val="accent1"/>
+          </a:effectRef>
+          <a:fontRef idx="minor">
+            <a:schemeClr val="tx1"/>
+          </a:fontRef>
+        </p:style>
+      </p:cxnSp>
+      <p:sp>
+        <p:nvSpPr>
+          <p:cNvPr id="2" name="TextBox 1">
+            <a:extLst>
+              <a:ext uri="{FF2B5EF4-FFF2-40B4-BE49-F238E27FC236}">
+                <a16:creationId xmlns:a16="http://schemas.microsoft.com/office/drawing/2014/main" id="{0CA6BAD3-0456-C980-7778-E95C7728794E}"/>
+              </a:ext>
+            </a:extLst>
+          </p:cNvPr>
+          <p:cNvSpPr txBox="1"/>
+          <p:nvPr/>
+        </p:nvSpPr>
+        <p:spPr>
+          <a:xfrm>
+            <a:off x="3741380" y="4031713"/>
+            <a:ext cx="952064" cy="369332"/>
+          </a:xfrm>
+          <a:prstGeom prst="rect">
+            <a:avLst/>
+          </a:prstGeom>
+          <a:noFill/>
+        </p:spPr>
+        <p:txBody>
+          <a:bodyPr wrap="square" rtlCol="0">
+            <a:spAutoFit/>
+          </a:bodyPr>
+          <a:lstStyle/>
+          <a:p>
+            <a:pPr algn="ctr"/>
+            <a:r>
+              <a:rPr lang="en-US" dirty="0"/>
+              <a:t>Ramp</a:t>
+            </a:r>
+          </a:p>
+        </p:txBody>
+      </p:sp>
+      <p:sp>
+        <p:nvSpPr>
+          <p:cNvPr id="4" name="TextBox 3">
+            <a:extLst>
+              <a:ext uri="{FF2B5EF4-FFF2-40B4-BE49-F238E27FC236}">
+                <a16:creationId xmlns:a16="http://schemas.microsoft.com/office/drawing/2014/main" id="{C4F5B417-7774-F5B7-4097-2E7F475529D7}"/>
+              </a:ext>
+            </a:extLst>
+          </p:cNvPr>
+          <p:cNvSpPr txBox="1"/>
+          <p:nvPr/>
+        </p:nvSpPr>
+        <p:spPr>
+          <a:xfrm>
+            <a:off x="2569742" y="2213657"/>
+            <a:ext cx="1824773" cy="369332"/>
+          </a:xfrm>
+          <a:prstGeom prst="rect">
+            <a:avLst/>
+          </a:prstGeom>
+          <a:noFill/>
+        </p:spPr>
+        <p:txBody>
+          <a:bodyPr wrap="square" rtlCol="0">
+            <a:spAutoFit/>
+          </a:bodyPr>
+          <a:lstStyle/>
+          <a:p>
+            <a:pPr algn="ctr"/>
+            <a:r>
+              <a:rPr lang="en-US" dirty="0"/>
+              <a:t>Secondary block</a:t>
+            </a:r>
+          </a:p>
+        </p:txBody>
+      </p:sp>
+      <p:sp>
+        <p:nvSpPr>
+          <p:cNvPr id="6" name="TextBox 5">
+            <a:extLst>
+              <a:ext uri="{FF2B5EF4-FFF2-40B4-BE49-F238E27FC236}">
+                <a16:creationId xmlns:a16="http://schemas.microsoft.com/office/drawing/2014/main" id="{3403BE78-9E5E-BFDF-DE7E-2D89744CC3BF}"/>
+              </a:ext>
+            </a:extLst>
+          </p:cNvPr>
+          <p:cNvSpPr txBox="1"/>
+          <p:nvPr/>
+        </p:nvSpPr>
+        <p:spPr>
+          <a:xfrm>
+            <a:off x="5921331" y="2213657"/>
+            <a:ext cx="1576750" cy="369332"/>
+          </a:xfrm>
+          <a:prstGeom prst="rect">
+            <a:avLst/>
+          </a:prstGeom>
+          <a:noFill/>
+        </p:spPr>
+        <p:txBody>
+          <a:bodyPr wrap="square" rtlCol="0">
+            <a:spAutoFit/>
+          </a:bodyPr>
+          <a:lstStyle/>
+          <a:p>
+            <a:pPr algn="ctr"/>
+            <a:r>
+              <a:rPr lang="en-US" dirty="0"/>
+              <a:t>Primary block</a:t>
+            </a:r>
+          </a:p>
+        </p:txBody>
+      </p:sp>
+      <p:sp>
+        <p:nvSpPr>
+          <p:cNvPr id="7" name="TextBox 6">
+            <a:extLst>
+              <a:ext uri="{FF2B5EF4-FFF2-40B4-BE49-F238E27FC236}">
+                <a16:creationId xmlns:a16="http://schemas.microsoft.com/office/drawing/2014/main" id="{8AAD170C-71E4-57BE-3C38-E8060D2C4402}"/>
+              </a:ext>
+            </a:extLst>
+          </p:cNvPr>
+          <p:cNvSpPr txBox="1"/>
+          <p:nvPr/>
+        </p:nvSpPr>
+        <p:spPr>
+          <a:xfrm>
+            <a:off x="5836257" y="3428999"/>
+            <a:ext cx="1206880" cy="369332"/>
+          </a:xfrm>
+          <a:prstGeom prst="rect">
+            <a:avLst/>
+          </a:prstGeom>
+          <a:noFill/>
+        </p:spPr>
+        <p:txBody>
+          <a:bodyPr wrap="square" rtlCol="0">
+            <a:spAutoFit/>
+          </a:bodyPr>
+          <a:lstStyle/>
+          <a:p>
+            <a:pPr algn="ctr"/>
+            <a:r>
+              <a:rPr lang="en-US" dirty="0"/>
+              <a:t>Swing arm</a:t>
+            </a:r>
+          </a:p>
+        </p:txBody>
+      </p:sp>
+      <p:sp>
+        <p:nvSpPr>
+          <p:cNvPr id="10" name="TextBox 9">
+            <a:extLst>
+              <a:ext uri="{FF2B5EF4-FFF2-40B4-BE49-F238E27FC236}">
+                <a16:creationId xmlns:a16="http://schemas.microsoft.com/office/drawing/2014/main" id="{9CCA1F45-CFEB-37C7-8DB1-EAD025F76553}"/>
+              </a:ext>
+            </a:extLst>
+          </p:cNvPr>
+          <p:cNvSpPr txBox="1"/>
+          <p:nvPr/>
+        </p:nvSpPr>
+        <p:spPr>
+          <a:xfrm>
+            <a:off x="5537815" y="4035575"/>
+            <a:ext cx="664202" cy="369332"/>
+          </a:xfrm>
+          <a:prstGeom prst="rect">
+            <a:avLst/>
+          </a:prstGeom>
+          <a:noFill/>
+        </p:spPr>
+        <p:txBody>
+          <a:bodyPr wrap="square" rtlCol="0">
+            <a:spAutoFit/>
+          </a:bodyPr>
+          <a:lstStyle/>
+          <a:p>
+            <a:pPr algn="ctr"/>
+            <a:r>
+              <a:rPr lang="en-US" dirty="0"/>
+              <a:t>Legs</a:t>
+            </a:r>
+          </a:p>
+        </p:txBody>
+      </p:sp>
+      <p:cxnSp>
+        <p:nvCxnSpPr>
+          <p:cNvPr id="11" name="Straight Arrow Connector 10">
+            <a:extLst>
+              <a:ext uri="{FF2B5EF4-FFF2-40B4-BE49-F238E27FC236}">
+                <a16:creationId xmlns:a16="http://schemas.microsoft.com/office/drawing/2014/main" id="{7B507AB7-63B2-E023-4507-BFB7984BFB7A}"/>
+              </a:ext>
+            </a:extLst>
+          </p:cNvPr>
+          <p:cNvCxnSpPr>
+            <a:cxnSpLocks/>
+            <a:endCxn id="4" idx="2"/>
+          </p:cNvCxnSpPr>
+          <p:nvPr/>
+        </p:nvCxnSpPr>
+        <p:spPr>
+          <a:xfrm flipH="1" flipV="1">
+            <a:off x="3482129" y="2582989"/>
+            <a:ext cx="711098" cy="392049"/>
+          </a:xfrm>
+          <a:prstGeom prst="straightConnector1">
+            <a:avLst/>
+          </a:prstGeom>
+          <a:ln w="34925" cap="rnd">
+            <a:solidFill>
+              <a:schemeClr val="accent6"/>
+            </a:solidFill>
+            <a:headEnd type="arrow" w="med" len="lg"/>
+            <a:tailEnd type="none"/>
+          </a:ln>
+          <a:effectLst>
+            <a:outerShdw blurRad="50800" dist="38100" dir="2700000" algn="tl" rotWithShape="0">
+              <a:prstClr val="black">
+                <a:alpha val="40000"/>
+              </a:prstClr>
+            </a:outerShdw>
+          </a:effectLst>
+        </p:spPr>
+        <p:style>
+          <a:lnRef idx="1">
+            <a:schemeClr val="accent1"/>
+          </a:lnRef>
+          <a:fillRef idx="0">
+            <a:schemeClr val="accent1"/>
+          </a:fillRef>
+          <a:effectRef idx="0">
+            <a:schemeClr val="accent1"/>
+          </a:effectRef>
+          <a:fontRef idx="minor">
+            <a:schemeClr val="tx1"/>
+          </a:fontRef>
+        </p:style>
+      </p:cxnSp>
+      <p:cxnSp>
+        <p:nvCxnSpPr>
+          <p:cNvPr id="15" name="Straight Arrow Connector 14">
+            <a:extLst>
+              <a:ext uri="{FF2B5EF4-FFF2-40B4-BE49-F238E27FC236}">
+                <a16:creationId xmlns:a16="http://schemas.microsoft.com/office/drawing/2014/main" id="{91627269-0836-9D4E-1BF6-82392B73522C}"/>
+              </a:ext>
+            </a:extLst>
+          </p:cNvPr>
+          <p:cNvCxnSpPr>
+            <a:cxnSpLocks/>
+            <a:endCxn id="6" idx="2"/>
+          </p:cNvCxnSpPr>
+          <p:nvPr/>
+        </p:nvCxnSpPr>
+        <p:spPr>
+          <a:xfrm flipV="1">
+            <a:off x="5751589" y="2582989"/>
+            <a:ext cx="958117" cy="369568"/>
+          </a:xfrm>
+          <a:prstGeom prst="straightConnector1">
+            <a:avLst/>
+          </a:prstGeom>
+          <a:ln w="34925" cap="rnd">
+            <a:solidFill>
+              <a:schemeClr val="accent6"/>
+            </a:solidFill>
+            <a:headEnd type="arrow" w="med" len="lg"/>
+            <a:tailEnd type="none"/>
+          </a:ln>
+          <a:effectLst>
+            <a:outerShdw blurRad="50800" dist="38100" dir="2700000" algn="tl" rotWithShape="0">
+              <a:prstClr val="black">
+                <a:alpha val="40000"/>
+              </a:prstClr>
+            </a:outerShdw>
+          </a:effectLst>
+        </p:spPr>
+        <p:style>
+          <a:lnRef idx="1">
+            <a:schemeClr val="accent1"/>
+          </a:lnRef>
+          <a:fillRef idx="0">
+            <a:schemeClr val="accent1"/>
+          </a:fillRef>
+          <a:effectRef idx="0">
+            <a:schemeClr val="accent1"/>
+          </a:effectRef>
+          <a:fontRef idx="minor">
+            <a:schemeClr val="tx1"/>
+          </a:fontRef>
+        </p:style>
+      </p:cxnSp>
+      <p:cxnSp>
+        <p:nvCxnSpPr>
+          <p:cNvPr id="18" name="Straight Arrow Connector 17">
+            <a:extLst>
+              <a:ext uri="{FF2B5EF4-FFF2-40B4-BE49-F238E27FC236}">
+                <a16:creationId xmlns:a16="http://schemas.microsoft.com/office/drawing/2014/main" id="{9C1CCB7B-F7BE-61F6-C7E7-941BAA5EE119}"/>
+              </a:ext>
+            </a:extLst>
+          </p:cNvPr>
+          <p:cNvCxnSpPr>
+            <a:cxnSpLocks/>
+            <a:endCxn id="7" idx="1"/>
+          </p:cNvCxnSpPr>
+          <p:nvPr/>
+        </p:nvCxnSpPr>
+        <p:spPr>
+          <a:xfrm>
+            <a:off x="5537815" y="3428999"/>
+            <a:ext cx="298442" cy="184666"/>
+          </a:xfrm>
+          <a:prstGeom prst="straightConnector1">
+            <a:avLst/>
+          </a:prstGeom>
+          <a:ln w="34925" cap="rnd">
+            <a:solidFill>
+              <a:schemeClr val="accent2"/>
+            </a:solidFill>
+            <a:headEnd type="arrow" w="med" len="lg"/>
+            <a:tailEnd type="none"/>
+          </a:ln>
+          <a:effectLst>
+            <a:outerShdw blurRad="50800" dist="38100" dir="2700000" algn="tl" rotWithShape="0">
+              <a:prstClr val="black">
+                <a:alpha val="40000"/>
+              </a:prstClr>
+            </a:outerShdw>
+          </a:effectLst>
+        </p:spPr>
+        <p:style>
+          <a:lnRef idx="1">
+            <a:schemeClr val="accent1"/>
+          </a:lnRef>
+          <a:fillRef idx="0">
+            <a:schemeClr val="accent1"/>
+          </a:fillRef>
+          <a:effectRef idx="0">
+            <a:schemeClr val="accent1"/>
+          </a:effectRef>
+          <a:fontRef idx="minor">
+            <a:schemeClr val="tx1"/>
+          </a:fontRef>
+        </p:style>
+      </p:cxnSp>
+      <p:cxnSp>
+        <p:nvCxnSpPr>
+          <p:cNvPr id="22" name="Straight Arrow Connector 21">
+            <a:extLst>
+              <a:ext uri="{FF2B5EF4-FFF2-40B4-BE49-F238E27FC236}">
+                <a16:creationId xmlns:a16="http://schemas.microsoft.com/office/drawing/2014/main" id="{51721793-64D8-5F33-1379-E65BCCB492D0}"/>
+              </a:ext>
+            </a:extLst>
+          </p:cNvPr>
+          <p:cNvCxnSpPr>
+            <a:cxnSpLocks/>
+            <a:endCxn id="2" idx="0"/>
+          </p:cNvCxnSpPr>
+          <p:nvPr/>
+        </p:nvCxnSpPr>
+        <p:spPr>
+          <a:xfrm>
+            <a:off x="3912042" y="3613665"/>
+            <a:ext cx="305370" cy="418048"/>
+          </a:xfrm>
+          <a:prstGeom prst="straightConnector1">
+            <a:avLst/>
+          </a:prstGeom>
+          <a:ln w="34925" cap="rnd">
+            <a:solidFill>
+              <a:srgbClr val="7030A0"/>
+            </a:solidFill>
+            <a:headEnd type="arrow" w="med" len="lg"/>
+            <a:tailEnd type="none"/>
+          </a:ln>
+          <a:effectLst>
+            <a:outerShdw blurRad="50800" dist="38100" dir="2700000" algn="tl" rotWithShape="0">
+              <a:prstClr val="black">
+                <a:alpha val="40000"/>
+              </a:prstClr>
+            </a:outerShdw>
+          </a:effectLst>
+        </p:spPr>
+        <p:style>
+          <a:lnRef idx="1">
+            <a:schemeClr val="accent1"/>
+          </a:lnRef>
+          <a:fillRef idx="0">
+            <a:schemeClr val="accent1"/>
+          </a:fillRef>
+          <a:effectRef idx="0">
+            <a:schemeClr val="accent1"/>
+          </a:effectRef>
+          <a:fontRef idx="minor">
+            <a:schemeClr val="tx1"/>
+          </a:fontRef>
+        </p:style>
+      </p:cxnSp>
+      <p:cxnSp>
+        <p:nvCxnSpPr>
+          <p:cNvPr id="27" name="Straight Arrow Connector 26">
+            <a:extLst>
+              <a:ext uri="{FF2B5EF4-FFF2-40B4-BE49-F238E27FC236}">
+                <a16:creationId xmlns:a16="http://schemas.microsoft.com/office/drawing/2014/main" id="{D0BB43EE-37E5-257C-6EE0-8E5FAFCDA28D}"/>
+              </a:ext>
+            </a:extLst>
+          </p:cNvPr>
+          <p:cNvCxnSpPr>
+            <a:cxnSpLocks/>
+            <a:endCxn id="10" idx="1"/>
+          </p:cNvCxnSpPr>
+          <p:nvPr/>
+        </p:nvCxnSpPr>
+        <p:spPr>
+          <a:xfrm>
+            <a:off x="4762854" y="3925004"/>
+            <a:ext cx="774961" cy="295237"/>
+          </a:xfrm>
+          <a:prstGeom prst="straightConnector1">
+            <a:avLst/>
+          </a:prstGeom>
+          <a:ln w="34925">
+            <a:solidFill>
+              <a:srgbClr val="C00000"/>
+            </a:solidFill>
+            <a:headEnd type="arrow" w="med" len="lg"/>
+            <a:tailEnd type="none"/>
+          </a:ln>
+          <a:effectLst>
+            <a:outerShdw blurRad="50800" dist="38100" dir="2700000" algn="tl" rotWithShape="0">
+              <a:prstClr val="black">
+                <a:alpha val="40000"/>
+              </a:prstClr>
+            </a:outerShdw>
+          </a:effectLst>
+        </p:spPr>
+        <p:style>
+          <a:lnRef idx="1">
+            <a:schemeClr val="accent1"/>
+          </a:lnRef>
+          <a:fillRef idx="0">
+            <a:schemeClr val="accent1"/>
+          </a:fillRef>
+          <a:effectRef idx="0">
+            <a:schemeClr val="accent1"/>
+          </a:effectRef>
+          <a:fontRef idx="minor">
+            <a:schemeClr val="tx1"/>
+          </a:fontRef>
+        </p:style>
+      </p:cxnSp>
+      <p:cxnSp>
+        <p:nvCxnSpPr>
+          <p:cNvPr id="32" name="Straight Arrow Connector 31">
+            <a:extLst>
+              <a:ext uri="{FF2B5EF4-FFF2-40B4-BE49-F238E27FC236}">
+                <a16:creationId xmlns:a16="http://schemas.microsoft.com/office/drawing/2014/main" id="{E13A946B-DFB1-D048-D44F-C7CA3ADBF977}"/>
+              </a:ext>
+            </a:extLst>
+          </p:cNvPr>
+          <p:cNvCxnSpPr>
+            <a:cxnSpLocks/>
+            <a:endCxn id="10" idx="1"/>
+          </p:cNvCxnSpPr>
+          <p:nvPr/>
+        </p:nvCxnSpPr>
+        <p:spPr>
+          <a:xfrm>
+            <a:off x="5348288" y="3897159"/>
+            <a:ext cx="189527" cy="323082"/>
+          </a:xfrm>
+          <a:prstGeom prst="straightConnector1">
+            <a:avLst/>
+          </a:prstGeom>
+          <a:ln w="34925" cap="rnd">
+            <a:solidFill>
+              <a:srgbClr val="C00000"/>
+            </a:solidFill>
+            <a:headEnd type="arrow" w="med" len="lg"/>
+            <a:tailEnd type="none"/>
+          </a:ln>
+          <a:effectLst>
+            <a:outerShdw blurRad="50800" dist="38100" dir="2700000" algn="tl" rotWithShape="0">
+              <a:prstClr val="black">
+                <a:alpha val="40000"/>
+              </a:prstClr>
+            </a:outerShdw>
+          </a:effectLst>
+        </p:spPr>
+        <p:style>
+          <a:lnRef idx="1">
+            <a:schemeClr val="accent1"/>
+          </a:lnRef>
+          <a:fillRef idx="0">
+            <a:schemeClr val="accent1"/>
+          </a:fillRef>
+          <a:effectRef idx="0">
+            <a:schemeClr val="accent1"/>
+          </a:effectRef>
+          <a:fontRef idx="minor">
+            <a:schemeClr val="tx1"/>
+          </a:fontRef>
+        </p:style>
+      </p:cxnSp>
+    </p:spTree>
+    <p:extLst>
+      <p:ext uri="{BB962C8B-B14F-4D97-AF65-F5344CB8AC3E}">
+        <p14:creationId xmlns:p14="http://schemas.microsoft.com/office/powerpoint/2010/main" val="1076934356"/>
+      </p:ext>
+    </p:extLst>
+  </p:cSld>
+  <p:clrMapOvr>
+    <a:masterClrMapping/>
+  </p:clrMapOvr>
+</p:sld>
+</file>
+
+<file path=ppt/slides/slide3.xml><?xml version="1.0" encoding="utf-8"?>
 <p:sld xmlns:a="http://schemas.openxmlformats.org/drawingml/2006/main" xmlns:r="http://schemas.openxmlformats.org/officeDocument/2006/relationships" xmlns:p="http://schemas.openxmlformats.org/presentationml/2006/main">
   <p:cSld>
     <p:spTree>
@@ -5942,8 +6707,8 @@
           </p:txBody>
         </p:sp>
       </p:grpSp>
-      <mc:AlternateContent xmlns:mc="http://schemas.openxmlformats.org/markup-compatibility/2006">
-        <mc:Choice xmlns:a14="http://schemas.microsoft.com/office/drawing/2010/main" Requires="a14">
+      <mc:AlternateContent xmlns:mc="http://schemas.openxmlformats.org/markup-compatibility/2006" xmlns:a14="http://schemas.microsoft.com/office/drawing/2010/main">
+        <mc:Choice Requires="a14">
           <p:sp>
             <p:nvSpPr>
               <p:cNvPr id="43" name="TextBox 42"/>
@@ -6249,7 +7014,7 @@
             </p:txBody>
           </p:sp>
         </mc:Choice>
-        <mc:Fallback>
+        <mc:Fallback xmlns="">
           <p:sp>
             <p:nvSpPr>
               <p:cNvPr id="43" name="TextBox 42"/>
@@ -6402,8 +7167,8 @@
           </a:p>
         </p:txBody>
       </p:sp>
-      <mc:AlternateContent xmlns:mc="http://schemas.openxmlformats.org/markup-compatibility/2006">
-        <mc:Choice xmlns:a14="http://schemas.microsoft.com/office/drawing/2010/main" Requires="a14">
+      <mc:AlternateContent xmlns:mc="http://schemas.openxmlformats.org/markup-compatibility/2006" xmlns:a14="http://schemas.microsoft.com/office/drawing/2010/main">
+        <mc:Choice Requires="a14">
           <p:sp>
             <p:nvSpPr>
               <p:cNvPr id="62" name="TextBox 61"/>
@@ -6471,7 +7236,7 @@
             </p:txBody>
           </p:sp>
         </mc:Choice>
-        <mc:Fallback>
+        <mc:Fallback xmlns="">
           <p:sp>
             <p:nvSpPr>
               <p:cNvPr id="62" name="TextBox 61"/>
@@ -6523,7 +7288,7 @@
 </p:sld>
 </file>
 
-<file path=ppt/slides/slide3.xml><?xml version="1.0" encoding="utf-8"?>
+<file path=ppt/slides/slide4.xml><?xml version="1.0" encoding="utf-8"?>
 <p:sld xmlns:a="http://schemas.openxmlformats.org/drawingml/2006/main" xmlns:r="http://schemas.openxmlformats.org/officeDocument/2006/relationships" xmlns:p="http://schemas.openxmlformats.org/presentationml/2006/main">
   <p:cSld>
     <p:spTree>
@@ -7468,7 +8233,7 @@
           <a:p>
             <a:fld id="{4AA3BEFA-5E9B-4D97-B013-761CA0334DD6}" type="slidenum">
               <a:rPr lang="en-US" smtClean="0"/>
-              <a:t>3</a:t>
+              <a:t>4</a:t>
             </a:fld>
             <a:endParaRPr lang="en-US"/>
           </a:p>

</xml_diff>